<commit_message>
Slides for lecture 17
</commit_message>
<xml_diff>
--- a/lectures/lecture_16/Lecture_16_Practical_Techniques_for_Discovering_Biomedical_Models.pptx
+++ b/lectures/lecture_16/Lecture_16_Practical_Techniques_for_Discovering_Biomedical_Models.pptx
@@ -5,10 +5,10 @@
     <p:sldMasterId id="2147483648" r:id="rId1"/>
   </p:sldMasterIdLst>
   <p:notesMasterIdLst>
-    <p:notesMasterId r:id="rId15"/>
+    <p:notesMasterId r:id="rId17"/>
   </p:notesMasterIdLst>
   <p:handoutMasterIdLst>
-    <p:handoutMasterId r:id="rId16"/>
+    <p:handoutMasterId r:id="rId18"/>
   </p:handoutMasterIdLst>
   <p:sldIdLst>
     <p:sldId id="347" r:id="rId2"/>
@@ -21,9 +21,11 @@
     <p:sldId id="372" r:id="rId9"/>
     <p:sldId id="373" r:id="rId10"/>
     <p:sldId id="374" r:id="rId11"/>
-    <p:sldId id="370" r:id="rId12"/>
-    <p:sldId id="365" r:id="rId13"/>
-    <p:sldId id="364" r:id="rId14"/>
+    <p:sldId id="375" r:id="rId12"/>
+    <p:sldId id="376" r:id="rId13"/>
+    <p:sldId id="370" r:id="rId14"/>
+    <p:sldId id="365" r:id="rId15"/>
+    <p:sldId id="364" r:id="rId16"/>
   </p:sldIdLst>
   <p:sldSz cx="9144000" cy="6858000" type="screen4x3"/>
   <p:notesSz cx="6858000" cy="9144000"/>
@@ -167,6 +169,8 @@
             <p14:sldId id="372"/>
             <p14:sldId id="373"/>
             <p14:sldId id="374"/>
+            <p14:sldId id="375"/>
+            <p14:sldId id="376"/>
             <p14:sldId id="370"/>
             <p14:sldId id="365"/>
             <p14:sldId id="364"/>
@@ -5916,7 +5920,7 @@
           <p:cNvPr id="2" name="Title 1">
             <a:extLst>
               <a:ext uri="{FF2B5EF4-FFF2-40B4-BE49-F238E27FC236}">
-                <a16:creationId xmlns:a16="http://schemas.microsoft.com/office/drawing/2014/main" id="{BB194215-DD6F-694E-97D4-100F3CFF9463}"/>
+                <a16:creationId xmlns:a16="http://schemas.microsoft.com/office/drawing/2014/main" id="{E5F1688F-EEC6-5348-94BC-84BD37900953}"/>
               </a:ext>
             </a:extLst>
           </p:cNvPr>
@@ -5934,17 +5938,17 @@
           <a:p>
             <a:r>
               <a:rPr lang="en-US" dirty="0"/>
-              <a:t>BACKUP</a:t>
-            </a:r>
-          </a:p>
-        </p:txBody>
-      </p:sp>
-      <p:sp>
-        <p:nvSpPr>
-          <p:cNvPr id="3" name="Content Placeholder 2">
+              <a:t>Residual-Driven Model Discovery (RDMD)</a:t>
+            </a:r>
+          </a:p>
+        </p:txBody>
+      </p:sp>
+      <p:sp>
+        <p:nvSpPr>
+          <p:cNvPr id="4" name="Content Placeholder 3">
             <a:extLst>
               <a:ext uri="{FF2B5EF4-FFF2-40B4-BE49-F238E27FC236}">
-                <a16:creationId xmlns:a16="http://schemas.microsoft.com/office/drawing/2014/main" id="{39808206-541E-F549-A4E6-8ECFCD043A31}"/>
+                <a16:creationId xmlns:a16="http://schemas.microsoft.com/office/drawing/2014/main" id="{58D92956-C864-3345-91D2-A2ACA33E04B9}"/>
               </a:ext>
             </a:extLst>
           </p:cNvPr>
@@ -5960,16 +5964,56 @@
           <a:bodyPr/>
           <a:lstStyle/>
           <a:p>
-            <a:endParaRPr lang="en-US"/>
-          </a:p>
-        </p:txBody>
-      </p:sp>
-      <p:sp>
-        <p:nvSpPr>
-          <p:cNvPr id="4" name="Slide Number Placeholder 3">
+            <a:endParaRPr lang="en-US" dirty="0"/>
+          </a:p>
+          <a:p>
+            <a:pPr marL="514350" indent="-514350">
+              <a:buFont typeface="+mj-lt"/>
+              <a:buAutoNum type="arabicPeriod"/>
+            </a:pPr>
+            <a:r>
+              <a:rPr lang="en-US" dirty="0"/>
+              <a:t>Find earliest time with large residuals</a:t>
+            </a:r>
+          </a:p>
+          <a:p>
+            <a:pPr marL="514350" indent="-514350">
+              <a:buFont typeface="+mj-lt"/>
+              <a:buAutoNum type="arabicPeriod"/>
+            </a:pPr>
+            <a:r>
+              <a:rPr lang="en-US" dirty="0"/>
+              <a:t>Identify which chemical species have large residuals</a:t>
+            </a:r>
+          </a:p>
+          <a:p>
+            <a:pPr marL="514350" indent="-514350">
+              <a:buFont typeface="+mj-lt"/>
+              <a:buAutoNum type="arabicPeriod"/>
+            </a:pPr>
+            <a:r>
+              <a:rPr lang="en-US" dirty="0"/>
+              <a:t>Adjust model and add parameters to reduce residuals.</a:t>
+            </a:r>
+          </a:p>
+          <a:p>
+            <a:pPr marL="514350" indent="-514350">
+              <a:buFont typeface="+mj-lt"/>
+              <a:buAutoNum type="arabicPeriod"/>
+            </a:pPr>
+            <a:r>
+              <a:rPr lang="en-US" dirty="0"/>
+              <a:t>Cross validate and/or bootstrap using just the time range under study.</a:t>
+            </a:r>
+          </a:p>
+        </p:txBody>
+      </p:sp>
+      <p:sp>
+        <p:nvSpPr>
+          <p:cNvPr id="3" name="Slide Number Placeholder 2">
             <a:extLst>
               <a:ext uri="{FF2B5EF4-FFF2-40B4-BE49-F238E27FC236}">
-                <a16:creationId xmlns:a16="http://schemas.microsoft.com/office/drawing/2014/main" id="{9A3807E4-81D1-AC4D-804A-6865D5CC3F51}"/>
+                <a16:creationId xmlns:a16="http://schemas.microsoft.com/office/drawing/2014/main" id="{092884F5-767C-FB4E-ADD9-B763D84ED460}"/>
               </a:ext>
             </a:extLst>
           </p:cNvPr>
@@ -5988,7 +6032,7 @@
             <a:pPr>
               <a:defRPr/>
             </a:pPr>
-            <a:fld id="{3EF4E9CC-9D91-476E-91FD-5BEEC1642931}" type="slidenum">
+            <a:fld id="{2E4304A7-0FB2-4094-BC1E-DB17183AD0C1}" type="slidenum">
               <a:rPr lang="en-US" altLang="x-none" smtClean="0"/>
               <a:pPr>
                 <a:defRPr/>
@@ -6002,7 +6046,7 @@
     </p:spTree>
     <p:extLst>
       <p:ext uri="{BB962C8B-B14F-4D97-AF65-F5344CB8AC3E}">
-        <p14:creationId xmlns:p14="http://schemas.microsoft.com/office/powerpoint/2010/main" val="4076099448"/>
+        <p14:creationId xmlns:p14="http://schemas.microsoft.com/office/powerpoint/2010/main" val="1928819496"/>
       </p:ext>
     </p:extLst>
   </p:cSld>
@@ -6031,10 +6075,10 @@
       </p:grpSpPr>
       <p:sp>
         <p:nvSpPr>
-          <p:cNvPr id="2" name="Title 1">
+          <p:cNvPr id="5" name="Title 4">
             <a:extLst>
               <a:ext uri="{FF2B5EF4-FFF2-40B4-BE49-F238E27FC236}">
-                <a16:creationId xmlns:a16="http://schemas.microsoft.com/office/drawing/2014/main" id="{3EBDC7A8-61C0-A84B-B5B6-252D4449A6B3}"/>
+                <a16:creationId xmlns:a16="http://schemas.microsoft.com/office/drawing/2014/main" id="{71DEA43B-F4BE-3447-8FEB-1236925340B0}"/>
               </a:ext>
             </a:extLst>
           </p:cNvPr>
@@ -6052,35 +6096,7 @@
           <a:p>
             <a:r>
               <a:rPr lang="en-US" dirty="0"/>
-              <a:t>Example</a:t>
-            </a:r>
-          </a:p>
-        </p:txBody>
-      </p:sp>
-      <p:sp>
-        <p:nvSpPr>
-          <p:cNvPr id="3" name="Content Placeholder 2">
-            <a:extLst>
-              <a:ext uri="{FF2B5EF4-FFF2-40B4-BE49-F238E27FC236}">
-                <a16:creationId xmlns:a16="http://schemas.microsoft.com/office/drawing/2014/main" id="{A6BAC94B-9EF2-9945-8598-41B7D98C4114}"/>
-              </a:ext>
-            </a:extLst>
-          </p:cNvPr>
-          <p:cNvSpPr>
-            <a:spLocks noGrp="1"/>
-          </p:cNvSpPr>
-          <p:nvPr>
-            <p:ph idx="1"/>
-          </p:nvPr>
-        </p:nvSpPr>
-        <p:spPr/>
-        <p:txBody>
-          <a:bodyPr/>
-          <a:lstStyle/>
-          <a:p>
-            <a:r>
-              <a:rPr lang="en-US" dirty="0"/>
-              <a:t>Generating a random model for a given set of chemical species and the boundary species</a:t>
+              <a:t>Example of RDMD</a:t>
             </a:r>
           </a:p>
         </p:txBody>
@@ -6090,7 +6106,7 @@
           <p:cNvPr id="4" name="Slide Number Placeholder 3">
             <a:extLst>
               <a:ext uri="{FF2B5EF4-FFF2-40B4-BE49-F238E27FC236}">
-                <a16:creationId xmlns:a16="http://schemas.microsoft.com/office/drawing/2014/main" id="{D8CF38CA-5200-0D48-B5C6-96313E2315D1}"/>
+                <a16:creationId xmlns:a16="http://schemas.microsoft.com/office/drawing/2014/main" id="{21907EEA-3FFB-EE4D-908C-3E426F926AB7}"/>
               </a:ext>
             </a:extLst>
           </p:cNvPr>
@@ -6120,16 +6136,619 @@
           </a:p>
         </p:txBody>
       </p:sp>
+      <p:pic>
+        <p:nvPicPr>
+          <p:cNvPr id="6" name="Picture 5">
+            <a:extLst>
+              <a:ext uri="{FF2B5EF4-FFF2-40B4-BE49-F238E27FC236}">
+                <a16:creationId xmlns:a16="http://schemas.microsoft.com/office/drawing/2014/main" id="{49E093D8-F93A-8145-81F7-C82FFDB6A844}"/>
+              </a:ext>
+            </a:extLst>
+          </p:cNvPr>
+          <p:cNvPicPr>
+            <a:picLocks noChangeAspect="1"/>
+          </p:cNvPicPr>
+          <p:nvPr/>
+        </p:nvPicPr>
+        <p:blipFill>
+          <a:blip r:embed="rId2"/>
+          <a:stretch>
+            <a:fillRect/>
+          </a:stretch>
+        </p:blipFill>
+        <p:spPr>
+          <a:xfrm>
+            <a:off x="304800" y="745191"/>
+            <a:ext cx="2413000" cy="1765300"/>
+          </a:xfrm>
+          <a:prstGeom prst="rect">
+            <a:avLst/>
+          </a:prstGeom>
+        </p:spPr>
+      </p:pic>
+      <p:pic>
+        <p:nvPicPr>
+          <p:cNvPr id="7" name="Picture 6">
+            <a:extLst>
+              <a:ext uri="{FF2B5EF4-FFF2-40B4-BE49-F238E27FC236}">
+                <a16:creationId xmlns:a16="http://schemas.microsoft.com/office/drawing/2014/main" id="{D7761440-4856-C04C-ABC8-1895624B2860}"/>
+              </a:ext>
+            </a:extLst>
+          </p:cNvPr>
+          <p:cNvPicPr>
+            <a:picLocks noChangeAspect="1"/>
+          </p:cNvPicPr>
+          <p:nvPr/>
+        </p:nvPicPr>
+        <p:blipFill>
+          <a:blip r:embed="rId3"/>
+          <a:stretch>
+            <a:fillRect/>
+          </a:stretch>
+        </p:blipFill>
+        <p:spPr>
+          <a:xfrm>
+            <a:off x="304800" y="2467908"/>
+            <a:ext cx="2451100" cy="1765300"/>
+          </a:xfrm>
+          <a:prstGeom prst="rect">
+            <a:avLst/>
+          </a:prstGeom>
+        </p:spPr>
+      </p:pic>
+      <p:pic>
+        <p:nvPicPr>
+          <p:cNvPr id="8" name="Picture 7">
+            <a:extLst>
+              <a:ext uri="{FF2B5EF4-FFF2-40B4-BE49-F238E27FC236}">
+                <a16:creationId xmlns:a16="http://schemas.microsoft.com/office/drawing/2014/main" id="{9DD7D8D4-6BA3-D740-8748-B186A8956823}"/>
+              </a:ext>
+            </a:extLst>
+          </p:cNvPr>
+          <p:cNvPicPr>
+            <a:picLocks noChangeAspect="1"/>
+          </p:cNvPicPr>
+          <p:nvPr/>
+        </p:nvPicPr>
+        <p:blipFill>
+          <a:blip r:embed="rId4"/>
+          <a:stretch>
+            <a:fillRect/>
+          </a:stretch>
+        </p:blipFill>
+        <p:spPr>
+          <a:xfrm>
+            <a:off x="304800" y="4347509"/>
+            <a:ext cx="2451100" cy="1765300"/>
+          </a:xfrm>
+          <a:prstGeom prst="rect">
+            <a:avLst/>
+          </a:prstGeom>
+        </p:spPr>
+      </p:pic>
+      <p:sp>
+        <p:nvSpPr>
+          <p:cNvPr id="9" name="Rectangle 8">
+            <a:extLst>
+              <a:ext uri="{FF2B5EF4-FFF2-40B4-BE49-F238E27FC236}">
+                <a16:creationId xmlns:a16="http://schemas.microsoft.com/office/drawing/2014/main" id="{D6A8A904-1DD9-3B4E-B5E5-E3F588EAD0B7}"/>
+              </a:ext>
+            </a:extLst>
+          </p:cNvPr>
+          <p:cNvSpPr/>
+          <p:nvPr/>
+        </p:nvSpPr>
+        <p:spPr>
+          <a:xfrm>
+            <a:off x="2850776" y="1305580"/>
+            <a:ext cx="6019800" cy="523220"/>
+          </a:xfrm>
+          <a:prstGeom prst="rect">
+            <a:avLst/>
+          </a:prstGeom>
+        </p:spPr>
+        <p:txBody>
+          <a:bodyPr wrap="square">
+            <a:spAutoFit/>
+          </a:bodyPr>
+          <a:lstStyle/>
+          <a:p>
+            <a:r>
+              <a:rPr lang="en-US" sz="1400" dirty="0"/>
+              <a:t>L7      </a:t>
+            </a:r>
+          </a:p>
+          <a:p>
+            <a:r>
+              <a:rPr lang="en-US" sz="1400" dirty="0"/>
+              <a:t>    - d_mRNA7*mRNA7;</a:t>
+            </a:r>
+          </a:p>
+        </p:txBody>
+      </p:sp>
+      <p:sp>
+        <p:nvSpPr>
+          <p:cNvPr id="10" name="TextBox 9">
+            <a:extLst>
+              <a:ext uri="{FF2B5EF4-FFF2-40B4-BE49-F238E27FC236}">
+                <a16:creationId xmlns:a16="http://schemas.microsoft.com/office/drawing/2014/main" id="{16E7D058-A204-8F4B-86D9-91F7218BDD30}"/>
+              </a:ext>
+            </a:extLst>
+          </p:cNvPr>
+          <p:cNvSpPr txBox="1"/>
+          <p:nvPr/>
+        </p:nvSpPr>
+        <p:spPr>
+          <a:xfrm>
+            <a:off x="2895600" y="762000"/>
+            <a:ext cx="1941557" cy="369332"/>
+          </a:xfrm>
+          <a:prstGeom prst="rect">
+            <a:avLst/>
+          </a:prstGeom>
+          <a:noFill/>
+        </p:spPr>
+        <p:txBody>
+          <a:bodyPr wrap="none" rtlCol="0">
+            <a:spAutoFit/>
+          </a:bodyPr>
+          <a:lstStyle/>
+          <a:p>
+            <a:r>
+              <a:rPr lang="en-US" b="1" dirty="0"/>
+              <a:t>mRNA7 kinetics</a:t>
+            </a:r>
+          </a:p>
+        </p:txBody>
+      </p:sp>
+      <p:sp>
+        <p:nvSpPr>
+          <p:cNvPr id="11" name="Rectangle 10">
+            <a:extLst>
+              <a:ext uri="{FF2B5EF4-FFF2-40B4-BE49-F238E27FC236}">
+                <a16:creationId xmlns:a16="http://schemas.microsoft.com/office/drawing/2014/main" id="{8E33AC76-A180-3249-8EDF-67A14F273829}"/>
+              </a:ext>
+            </a:extLst>
+          </p:cNvPr>
+          <p:cNvSpPr/>
+          <p:nvPr/>
+        </p:nvSpPr>
+        <p:spPr>
+          <a:xfrm>
+            <a:off x="2819400" y="2895600"/>
+            <a:ext cx="6019800" cy="523220"/>
+          </a:xfrm>
+          <a:prstGeom prst="rect">
+            <a:avLst/>
+          </a:prstGeom>
+        </p:spPr>
+        <p:txBody>
+          <a:bodyPr wrap="square">
+            <a:spAutoFit/>
+          </a:bodyPr>
+          <a:lstStyle/>
+          <a:p>
+            <a:r>
+              <a:rPr lang="en-US" sz="1400" dirty="0"/>
+              <a:t>L7 +  Vm7*(1/(1 + K2_7*P7^H7))     </a:t>
+            </a:r>
+          </a:p>
+          <a:p>
+            <a:r>
+              <a:rPr lang="en-US" sz="1400" dirty="0"/>
+              <a:t>    - d_mRNA7*mRNA7;</a:t>
+            </a:r>
+          </a:p>
+        </p:txBody>
+      </p:sp>
+      <p:sp>
+        <p:nvSpPr>
+          <p:cNvPr id="12" name="Rectangle 11">
+            <a:extLst>
+              <a:ext uri="{FF2B5EF4-FFF2-40B4-BE49-F238E27FC236}">
+                <a16:creationId xmlns:a16="http://schemas.microsoft.com/office/drawing/2014/main" id="{9A5A69EA-CE09-7E45-9E38-42C1C86112E1}"/>
+              </a:ext>
+            </a:extLst>
+          </p:cNvPr>
+          <p:cNvSpPr/>
+          <p:nvPr/>
+        </p:nvSpPr>
+        <p:spPr>
+          <a:xfrm>
+            <a:off x="2819400" y="4724400"/>
+            <a:ext cx="6019800" cy="523220"/>
+          </a:xfrm>
+          <a:prstGeom prst="rect">
+            <a:avLst/>
+          </a:prstGeom>
+        </p:spPr>
+        <p:txBody>
+          <a:bodyPr wrap="square">
+            <a:spAutoFit/>
+          </a:bodyPr>
+          <a:lstStyle/>
+          <a:p>
+            <a:r>
+              <a:rPr lang="en-US" sz="1400" dirty="0"/>
+              <a:t>L7 +  Vm7*( K1_7*P1^H7/(1 + K1_7*P1^H7) + 1/(1 + K2_7*P7^H7))     </a:t>
+            </a:r>
+          </a:p>
+          <a:p>
+            <a:r>
+              <a:rPr lang="en-US" sz="1400" dirty="0"/>
+              <a:t>    - d_mRNA7*mRNA7;</a:t>
+            </a:r>
+          </a:p>
+        </p:txBody>
+      </p:sp>
+      <p:sp>
+        <p:nvSpPr>
+          <p:cNvPr id="13" name="TextBox 12">
+            <a:extLst>
+              <a:ext uri="{FF2B5EF4-FFF2-40B4-BE49-F238E27FC236}">
+                <a16:creationId xmlns:a16="http://schemas.microsoft.com/office/drawing/2014/main" id="{22BA9B84-2A0C-0444-A466-87A3C1814A98}"/>
+              </a:ext>
+            </a:extLst>
+          </p:cNvPr>
+          <p:cNvSpPr txBox="1"/>
+          <p:nvPr/>
+        </p:nvSpPr>
+        <p:spPr>
+          <a:xfrm>
+            <a:off x="1181725" y="685800"/>
+            <a:ext cx="723275" cy="369332"/>
+          </a:xfrm>
+          <a:prstGeom prst="rect">
+            <a:avLst/>
+          </a:prstGeom>
+          <a:solidFill>
+            <a:schemeClr val="bg1"/>
+          </a:solidFill>
+        </p:spPr>
+        <p:txBody>
+          <a:bodyPr wrap="none" rtlCol="0">
+            <a:spAutoFit/>
+          </a:bodyPr>
+          <a:lstStyle/>
+          <a:p>
+            <a:r>
+              <a:rPr lang="en-US" u="sng" dirty="0"/>
+              <a:t>Initial</a:t>
+            </a:r>
+          </a:p>
+        </p:txBody>
+      </p:sp>
+      <p:sp>
+        <p:nvSpPr>
+          <p:cNvPr id="14" name="TextBox 13">
+            <a:extLst>
+              <a:ext uri="{FF2B5EF4-FFF2-40B4-BE49-F238E27FC236}">
+                <a16:creationId xmlns:a16="http://schemas.microsoft.com/office/drawing/2014/main" id="{55A630D3-3112-ED42-99A4-B667BA8E6359}"/>
+              </a:ext>
+            </a:extLst>
+          </p:cNvPr>
+          <p:cNvSpPr txBox="1"/>
+          <p:nvPr/>
+        </p:nvSpPr>
+        <p:spPr>
+          <a:xfrm>
+            <a:off x="856660" y="2450068"/>
+            <a:ext cx="1492716" cy="369332"/>
+          </a:xfrm>
+          <a:prstGeom prst="rect">
+            <a:avLst/>
+          </a:prstGeom>
+          <a:solidFill>
+            <a:schemeClr val="bg1"/>
+          </a:solidFill>
+        </p:spPr>
+        <p:txBody>
+          <a:bodyPr wrap="none" rtlCol="0">
+            <a:spAutoFit/>
+          </a:bodyPr>
+          <a:lstStyle/>
+          <a:p>
+            <a:r>
+              <a:rPr lang="en-US" u="sng" dirty="0"/>
+              <a:t>P7 </a:t>
+            </a:r>
+            <a:r>
+              <a:rPr lang="en-US" u="sng" dirty="0" err="1"/>
+              <a:t>inihibition</a:t>
+            </a:r>
+            <a:endParaRPr lang="en-US" u="sng" dirty="0"/>
+          </a:p>
+        </p:txBody>
+      </p:sp>
+      <p:sp>
+        <p:nvSpPr>
+          <p:cNvPr id="15" name="TextBox 14">
+            <a:extLst>
+              <a:ext uri="{FF2B5EF4-FFF2-40B4-BE49-F238E27FC236}">
+                <a16:creationId xmlns:a16="http://schemas.microsoft.com/office/drawing/2014/main" id="{4191B97F-0E9C-B348-86C3-958D47558D8B}"/>
+              </a:ext>
+            </a:extLst>
+          </p:cNvPr>
+          <p:cNvSpPr txBox="1"/>
+          <p:nvPr/>
+        </p:nvSpPr>
+        <p:spPr>
+          <a:xfrm>
+            <a:off x="533400" y="4202668"/>
+            <a:ext cx="3089307" cy="369332"/>
+          </a:xfrm>
+          <a:prstGeom prst="rect">
+            <a:avLst/>
+          </a:prstGeom>
+          <a:solidFill>
+            <a:schemeClr val="bg1"/>
+          </a:solidFill>
+        </p:spPr>
+        <p:txBody>
+          <a:bodyPr wrap="none" rtlCol="0">
+            <a:spAutoFit/>
+          </a:bodyPr>
+          <a:lstStyle/>
+          <a:p>
+            <a:r>
+              <a:rPr lang="en-US" u="sng" dirty="0"/>
+              <a:t>P7 </a:t>
+            </a:r>
+            <a:r>
+              <a:rPr lang="en-US" u="sng" dirty="0" err="1"/>
+              <a:t>inihibition</a:t>
+            </a:r>
+            <a:r>
+              <a:rPr lang="en-US" u="sng" dirty="0"/>
+              <a:t> + P1 activation</a:t>
+            </a:r>
+          </a:p>
+        </p:txBody>
+      </p:sp>
     </p:spTree>
     <p:extLst>
       <p:ext uri="{BB962C8B-B14F-4D97-AF65-F5344CB8AC3E}">
-        <p14:creationId xmlns:p14="http://schemas.microsoft.com/office/powerpoint/2010/main" val="1601846416"/>
+        <p14:creationId xmlns:p14="http://schemas.microsoft.com/office/powerpoint/2010/main" val="2586255541"/>
       </p:ext>
     </p:extLst>
   </p:cSld>
   <p:clrMapOvr>
     <a:masterClrMapping/>
   </p:clrMapOvr>
+  <p:timing>
+    <p:tnLst>
+      <p:par>
+        <p:cTn id="1" dur="indefinite" restart="never" nodeType="tmRoot">
+          <p:childTnLst>
+            <p:seq concurrent="1" nextAc="seek">
+              <p:cTn id="2" dur="indefinite" nodeType="mainSeq">
+                <p:childTnLst>
+                  <p:par>
+                    <p:cTn id="3" fill="hold">
+                      <p:stCondLst>
+                        <p:cond delay="indefinite"/>
+                      </p:stCondLst>
+                      <p:childTnLst>
+                        <p:par>
+                          <p:cTn id="4" fill="hold">
+                            <p:stCondLst>
+                              <p:cond delay="0"/>
+                            </p:stCondLst>
+                            <p:childTnLst>
+                              <p:par>
+                                <p:cTn id="5" presetID="1" presetClass="entr" presetSubtype="0" fill="hold" nodeType="clickEffect">
+                                  <p:stCondLst>
+                                    <p:cond delay="0"/>
+                                  </p:stCondLst>
+                                  <p:childTnLst>
+                                    <p:set>
+                                      <p:cBhvr>
+                                        <p:cTn id="6" dur="1" fill="hold">
+                                          <p:stCondLst>
+                                            <p:cond delay="0"/>
+                                          </p:stCondLst>
+                                        </p:cTn>
+                                        <p:tgtEl>
+                                          <p:spTgt spid="7"/>
+                                        </p:tgtEl>
+                                        <p:attrNameLst>
+                                          <p:attrName>style.visibility</p:attrName>
+                                        </p:attrNameLst>
+                                      </p:cBhvr>
+                                      <p:to>
+                                        <p:strVal val="visible"/>
+                                      </p:to>
+                                    </p:set>
+                                  </p:childTnLst>
+                                </p:cTn>
+                              </p:par>
+                              <p:par>
+                                <p:cTn id="7" presetID="1" presetClass="entr" presetSubtype="0" fill="hold" grpId="0" nodeType="withEffect">
+                                  <p:stCondLst>
+                                    <p:cond delay="0"/>
+                                  </p:stCondLst>
+                                  <p:childTnLst>
+                                    <p:set>
+                                      <p:cBhvr>
+                                        <p:cTn id="8" dur="1" fill="hold">
+                                          <p:stCondLst>
+                                            <p:cond delay="0"/>
+                                          </p:stCondLst>
+                                        </p:cTn>
+                                        <p:tgtEl>
+                                          <p:spTgt spid="14"/>
+                                        </p:tgtEl>
+                                        <p:attrNameLst>
+                                          <p:attrName>style.visibility</p:attrName>
+                                        </p:attrNameLst>
+                                      </p:cBhvr>
+                                      <p:to>
+                                        <p:strVal val="visible"/>
+                                      </p:to>
+                                    </p:set>
+                                  </p:childTnLst>
+                                </p:cTn>
+                              </p:par>
+                              <p:par>
+                                <p:cTn id="9" presetID="1" presetClass="entr" presetSubtype="0" fill="hold" grpId="0" nodeType="withEffect">
+                                  <p:stCondLst>
+                                    <p:cond delay="0"/>
+                                  </p:stCondLst>
+                                  <p:childTnLst>
+                                    <p:set>
+                                      <p:cBhvr>
+                                        <p:cTn id="10" dur="1" fill="hold">
+                                          <p:stCondLst>
+                                            <p:cond delay="0"/>
+                                          </p:stCondLst>
+                                        </p:cTn>
+                                        <p:tgtEl>
+                                          <p:spTgt spid="11"/>
+                                        </p:tgtEl>
+                                        <p:attrNameLst>
+                                          <p:attrName>style.visibility</p:attrName>
+                                        </p:attrNameLst>
+                                      </p:cBhvr>
+                                      <p:to>
+                                        <p:strVal val="visible"/>
+                                      </p:to>
+                                    </p:set>
+                                  </p:childTnLst>
+                                </p:cTn>
+                              </p:par>
+                            </p:childTnLst>
+                          </p:cTn>
+                        </p:par>
+                      </p:childTnLst>
+                    </p:cTn>
+                  </p:par>
+                  <p:par>
+                    <p:cTn id="11" fill="hold">
+                      <p:stCondLst>
+                        <p:cond delay="indefinite"/>
+                      </p:stCondLst>
+                      <p:childTnLst>
+                        <p:par>
+                          <p:cTn id="12" fill="hold">
+                            <p:stCondLst>
+                              <p:cond delay="0"/>
+                            </p:stCondLst>
+                            <p:childTnLst>
+                              <p:par>
+                                <p:cTn id="13" presetID="1" presetClass="entr" presetSubtype="0" fill="hold" nodeType="clickEffect">
+                                  <p:stCondLst>
+                                    <p:cond delay="0"/>
+                                  </p:stCondLst>
+                                  <p:childTnLst>
+                                    <p:set>
+                                      <p:cBhvr>
+                                        <p:cTn id="14" dur="1" fill="hold">
+                                          <p:stCondLst>
+                                            <p:cond delay="0"/>
+                                          </p:stCondLst>
+                                        </p:cTn>
+                                        <p:tgtEl>
+                                          <p:spTgt spid="8"/>
+                                        </p:tgtEl>
+                                        <p:attrNameLst>
+                                          <p:attrName>style.visibility</p:attrName>
+                                        </p:attrNameLst>
+                                      </p:cBhvr>
+                                      <p:to>
+                                        <p:strVal val="visible"/>
+                                      </p:to>
+                                    </p:set>
+                                  </p:childTnLst>
+                                </p:cTn>
+                              </p:par>
+                              <p:par>
+                                <p:cTn id="15" presetID="1" presetClass="entr" presetSubtype="0" fill="hold" grpId="0" nodeType="withEffect">
+                                  <p:stCondLst>
+                                    <p:cond delay="0"/>
+                                  </p:stCondLst>
+                                  <p:childTnLst>
+                                    <p:set>
+                                      <p:cBhvr>
+                                        <p:cTn id="16" dur="1" fill="hold">
+                                          <p:stCondLst>
+                                            <p:cond delay="0"/>
+                                          </p:stCondLst>
+                                        </p:cTn>
+                                        <p:tgtEl>
+                                          <p:spTgt spid="15"/>
+                                        </p:tgtEl>
+                                        <p:attrNameLst>
+                                          <p:attrName>style.visibility</p:attrName>
+                                        </p:attrNameLst>
+                                      </p:cBhvr>
+                                      <p:to>
+                                        <p:strVal val="visible"/>
+                                      </p:to>
+                                    </p:set>
+                                  </p:childTnLst>
+                                </p:cTn>
+                              </p:par>
+                              <p:par>
+                                <p:cTn id="17" presetID="1" presetClass="entr" presetSubtype="0" fill="hold" grpId="0" nodeType="withEffect">
+                                  <p:stCondLst>
+                                    <p:cond delay="0"/>
+                                  </p:stCondLst>
+                                  <p:childTnLst>
+                                    <p:set>
+                                      <p:cBhvr>
+                                        <p:cTn id="18" dur="1" fill="hold">
+                                          <p:stCondLst>
+                                            <p:cond delay="0"/>
+                                          </p:stCondLst>
+                                        </p:cTn>
+                                        <p:tgtEl>
+                                          <p:spTgt spid="12"/>
+                                        </p:tgtEl>
+                                        <p:attrNameLst>
+                                          <p:attrName>style.visibility</p:attrName>
+                                        </p:attrNameLst>
+                                      </p:cBhvr>
+                                      <p:to>
+                                        <p:strVal val="visible"/>
+                                      </p:to>
+                                    </p:set>
+                                  </p:childTnLst>
+                                </p:cTn>
+                              </p:par>
+                            </p:childTnLst>
+                          </p:cTn>
+                        </p:par>
+                      </p:childTnLst>
+                    </p:cTn>
+                  </p:par>
+                </p:childTnLst>
+              </p:cTn>
+              <p:prevCondLst>
+                <p:cond evt="onPrev" delay="0">
+                  <p:tgtEl>
+                    <p:sldTgt/>
+                  </p:tgtEl>
+                </p:cond>
+              </p:prevCondLst>
+              <p:nextCondLst>
+                <p:cond evt="onNext" delay="0">
+                  <p:tgtEl>
+                    <p:sldTgt/>
+                  </p:tgtEl>
+                </p:cond>
+              </p:nextCondLst>
+            </p:seq>
+          </p:childTnLst>
+        </p:cTn>
+      </p:par>
+    </p:tnLst>
+    <p:bldLst>
+      <p:bldP spid="11" grpId="0"/>
+      <p:bldP spid="12" grpId="0"/>
+      <p:bldP spid="14" grpId="0" animBg="1"/>
+      <p:bldP spid="15" grpId="0" animBg="1"/>
+    </p:bldLst>
+  </p:timing>
 </p:sld>
 </file>
 
@@ -6155,6 +6774,245 @@
           <p:cNvPr id="2" name="Title 1">
             <a:extLst>
               <a:ext uri="{FF2B5EF4-FFF2-40B4-BE49-F238E27FC236}">
+                <a16:creationId xmlns:a16="http://schemas.microsoft.com/office/drawing/2014/main" id="{BB194215-DD6F-694E-97D4-100F3CFF9463}"/>
+              </a:ext>
+            </a:extLst>
+          </p:cNvPr>
+          <p:cNvSpPr>
+            <a:spLocks noGrp="1"/>
+          </p:cNvSpPr>
+          <p:nvPr>
+            <p:ph type="title"/>
+          </p:nvPr>
+        </p:nvSpPr>
+        <p:spPr/>
+        <p:txBody>
+          <a:bodyPr/>
+          <a:lstStyle/>
+          <a:p>
+            <a:r>
+              <a:rPr lang="en-US" dirty="0"/>
+              <a:t>BACKUP</a:t>
+            </a:r>
+          </a:p>
+        </p:txBody>
+      </p:sp>
+      <p:sp>
+        <p:nvSpPr>
+          <p:cNvPr id="3" name="Content Placeholder 2">
+            <a:extLst>
+              <a:ext uri="{FF2B5EF4-FFF2-40B4-BE49-F238E27FC236}">
+                <a16:creationId xmlns:a16="http://schemas.microsoft.com/office/drawing/2014/main" id="{39808206-541E-F549-A4E6-8ECFCD043A31}"/>
+              </a:ext>
+            </a:extLst>
+          </p:cNvPr>
+          <p:cNvSpPr>
+            <a:spLocks noGrp="1"/>
+          </p:cNvSpPr>
+          <p:nvPr>
+            <p:ph idx="1"/>
+          </p:nvPr>
+        </p:nvSpPr>
+        <p:spPr/>
+        <p:txBody>
+          <a:bodyPr/>
+          <a:lstStyle/>
+          <a:p>
+            <a:endParaRPr lang="en-US"/>
+          </a:p>
+        </p:txBody>
+      </p:sp>
+      <p:sp>
+        <p:nvSpPr>
+          <p:cNvPr id="4" name="Slide Number Placeholder 3">
+            <a:extLst>
+              <a:ext uri="{FF2B5EF4-FFF2-40B4-BE49-F238E27FC236}">
+                <a16:creationId xmlns:a16="http://schemas.microsoft.com/office/drawing/2014/main" id="{9A3807E4-81D1-AC4D-804A-6865D5CC3F51}"/>
+              </a:ext>
+            </a:extLst>
+          </p:cNvPr>
+          <p:cNvSpPr>
+            <a:spLocks noGrp="1"/>
+          </p:cNvSpPr>
+          <p:nvPr>
+            <p:ph type="sldNum" sz="quarter" idx="11"/>
+          </p:nvPr>
+        </p:nvSpPr>
+        <p:spPr/>
+        <p:txBody>
+          <a:bodyPr/>
+          <a:lstStyle/>
+          <a:p>
+            <a:pPr>
+              <a:defRPr/>
+            </a:pPr>
+            <a:fld id="{3EF4E9CC-9D91-476E-91FD-5BEEC1642931}" type="slidenum">
+              <a:rPr lang="en-US" altLang="x-none" smtClean="0"/>
+              <a:pPr>
+                <a:defRPr/>
+              </a:pPr>
+              <a:t>13</a:t>
+            </a:fld>
+            <a:endParaRPr lang="en-US" altLang="x-none"/>
+          </a:p>
+        </p:txBody>
+      </p:sp>
+    </p:spTree>
+    <p:extLst>
+      <p:ext uri="{BB962C8B-B14F-4D97-AF65-F5344CB8AC3E}">
+        <p14:creationId xmlns:p14="http://schemas.microsoft.com/office/powerpoint/2010/main" val="4076099448"/>
+      </p:ext>
+    </p:extLst>
+  </p:cSld>
+  <p:clrMapOvr>
+    <a:masterClrMapping/>
+  </p:clrMapOvr>
+</p:sld>
+</file>
+
+<file path=ppt/slides/slide14.xml><?xml version="1.0" encoding="utf-8"?>
+<p:sld xmlns:a="http://schemas.openxmlformats.org/drawingml/2006/main" xmlns:r="http://schemas.openxmlformats.org/officeDocument/2006/relationships" xmlns:p="http://schemas.openxmlformats.org/presentationml/2006/main">
+  <p:cSld>
+    <p:spTree>
+      <p:nvGrpSpPr>
+        <p:cNvPr id="1" name=""/>
+        <p:cNvGrpSpPr/>
+        <p:nvPr/>
+      </p:nvGrpSpPr>
+      <p:grpSpPr>
+        <a:xfrm>
+          <a:off x="0" y="0"/>
+          <a:ext cx="0" cy="0"/>
+          <a:chOff x="0" y="0"/>
+          <a:chExt cx="0" cy="0"/>
+        </a:xfrm>
+      </p:grpSpPr>
+      <p:sp>
+        <p:nvSpPr>
+          <p:cNvPr id="2" name="Title 1">
+            <a:extLst>
+              <a:ext uri="{FF2B5EF4-FFF2-40B4-BE49-F238E27FC236}">
+                <a16:creationId xmlns:a16="http://schemas.microsoft.com/office/drawing/2014/main" id="{3EBDC7A8-61C0-A84B-B5B6-252D4449A6B3}"/>
+              </a:ext>
+            </a:extLst>
+          </p:cNvPr>
+          <p:cNvSpPr>
+            <a:spLocks noGrp="1"/>
+          </p:cNvSpPr>
+          <p:nvPr>
+            <p:ph type="title"/>
+          </p:nvPr>
+        </p:nvSpPr>
+        <p:spPr/>
+        <p:txBody>
+          <a:bodyPr/>
+          <a:lstStyle/>
+          <a:p>
+            <a:r>
+              <a:rPr lang="en-US" dirty="0"/>
+              <a:t>Example</a:t>
+            </a:r>
+          </a:p>
+        </p:txBody>
+      </p:sp>
+      <p:sp>
+        <p:nvSpPr>
+          <p:cNvPr id="3" name="Content Placeholder 2">
+            <a:extLst>
+              <a:ext uri="{FF2B5EF4-FFF2-40B4-BE49-F238E27FC236}">
+                <a16:creationId xmlns:a16="http://schemas.microsoft.com/office/drawing/2014/main" id="{A6BAC94B-9EF2-9945-8598-41B7D98C4114}"/>
+              </a:ext>
+            </a:extLst>
+          </p:cNvPr>
+          <p:cNvSpPr>
+            <a:spLocks noGrp="1"/>
+          </p:cNvSpPr>
+          <p:nvPr>
+            <p:ph idx="1"/>
+          </p:nvPr>
+        </p:nvSpPr>
+        <p:spPr/>
+        <p:txBody>
+          <a:bodyPr/>
+          <a:lstStyle/>
+          <a:p>
+            <a:r>
+              <a:rPr lang="en-US" dirty="0"/>
+              <a:t>Generating a random model for a given set of chemical species and the boundary species</a:t>
+            </a:r>
+          </a:p>
+        </p:txBody>
+      </p:sp>
+      <p:sp>
+        <p:nvSpPr>
+          <p:cNvPr id="4" name="Slide Number Placeholder 3">
+            <a:extLst>
+              <a:ext uri="{FF2B5EF4-FFF2-40B4-BE49-F238E27FC236}">
+                <a16:creationId xmlns:a16="http://schemas.microsoft.com/office/drawing/2014/main" id="{D8CF38CA-5200-0D48-B5C6-96313E2315D1}"/>
+              </a:ext>
+            </a:extLst>
+          </p:cNvPr>
+          <p:cNvSpPr>
+            <a:spLocks noGrp="1"/>
+          </p:cNvSpPr>
+          <p:nvPr>
+            <p:ph type="sldNum" sz="quarter" idx="11"/>
+          </p:nvPr>
+        </p:nvSpPr>
+        <p:spPr/>
+        <p:txBody>
+          <a:bodyPr/>
+          <a:lstStyle/>
+          <a:p>
+            <a:pPr>
+              <a:defRPr/>
+            </a:pPr>
+            <a:fld id="{3EF4E9CC-9D91-476E-91FD-5BEEC1642931}" type="slidenum">
+              <a:rPr lang="en-US" altLang="x-none" smtClean="0"/>
+              <a:pPr>
+                <a:defRPr/>
+              </a:pPr>
+              <a:t>14</a:t>
+            </a:fld>
+            <a:endParaRPr lang="en-US" altLang="x-none"/>
+          </a:p>
+        </p:txBody>
+      </p:sp>
+    </p:spTree>
+    <p:extLst>
+      <p:ext uri="{BB962C8B-B14F-4D97-AF65-F5344CB8AC3E}">
+        <p14:creationId xmlns:p14="http://schemas.microsoft.com/office/powerpoint/2010/main" val="1601846416"/>
+      </p:ext>
+    </p:extLst>
+  </p:cSld>
+  <p:clrMapOvr>
+    <a:masterClrMapping/>
+  </p:clrMapOvr>
+</p:sld>
+</file>
+
+<file path=ppt/slides/slide15.xml><?xml version="1.0" encoding="utf-8"?>
+<p:sld xmlns:a="http://schemas.openxmlformats.org/drawingml/2006/main" xmlns:r="http://schemas.openxmlformats.org/officeDocument/2006/relationships" xmlns:p="http://schemas.openxmlformats.org/presentationml/2006/main">
+  <p:cSld>
+    <p:spTree>
+      <p:nvGrpSpPr>
+        <p:cNvPr id="1" name=""/>
+        <p:cNvGrpSpPr/>
+        <p:nvPr/>
+      </p:nvGrpSpPr>
+      <p:grpSpPr>
+        <a:xfrm>
+          <a:off x="0" y="0"/>
+          <a:ext cx="0" cy="0"/>
+          <a:chOff x="0" y="0"/>
+          <a:chExt cx="0" cy="0"/>
+        </a:xfrm>
+      </p:grpSpPr>
+      <p:sp>
+        <p:nvSpPr>
+          <p:cNvPr id="2" name="Title 1">
+            <a:extLst>
+              <a:ext uri="{FF2B5EF4-FFF2-40B4-BE49-F238E27FC236}">
                 <a16:creationId xmlns:a16="http://schemas.microsoft.com/office/drawing/2014/main" id="{D7AC62EE-2B08-3643-8DD2-83135BDF456B}"/>
               </a:ext>
             </a:extLst>
@@ -6281,7 +7139,7 @@
               <a:pPr>
                 <a:defRPr/>
               </a:pPr>
-              <a:t>13</a:t>
+              <a:t>15</a:t>
             </a:fld>
             <a:endParaRPr lang="en-US" altLang="x-none"/>
           </a:p>
@@ -6532,14 +7390,13 @@
           <a:p>
             <a:r>
               <a:rPr lang="en-US" dirty="0"/>
-              <a:t>Parameter fitting for data subsets: time, species</a:t>
-            </a:r>
-          </a:p>
-          <a:p>
-            <a:r>
-              <a:rPr lang="en-US" dirty="0"/>
-              <a:t>Generating models</a:t>
-            </a:r>
+              <a:t>Residual-driven </a:t>
+            </a:r>
+            <a:r>
+              <a:rPr lang="en-US"/>
+              <a:t>model discovery</a:t>
+            </a:r>
+            <a:endParaRPr lang="en-US" dirty="0"/>
           </a:p>
         </p:txBody>
       </p:sp>

</xml_diff>